<commit_message>
Update ppt w/ usecase diagram
</commit_message>
<xml_diff>
--- a/ContactManager.pptx
+++ b/ContactManager.pptx
@@ -108,6 +108,11 @@
       </a:defRPr>
     </a:lvl9pPr>
   </p:defaultTextStyle>
+  <p:extLst>
+    <p:ext uri="{EFAFB233-063F-42B5-8137-9DF3F51BA10A}">
+      <p15:sldGuideLst xmlns:p15="http://schemas.microsoft.com/office/powerpoint/2012/main"/>
+    </p:ext>
+  </p:extLst>
 </p:presentation>
 </file>
 
@@ -258,7 +263,7 @@
           <a:p>
             <a:fld id="{1B6CB649-B23B-4A05-B2FC-2C0823D80EF2}" type="datetimeFigureOut">
               <a:rPr lang="en-US" smtClean="0"/>
-              <a:t>9/8/2018</a:t>
+              <a:t>9/9/2018</a:t>
             </a:fld>
             <a:endParaRPr lang="en-US"/>
           </a:p>
@@ -456,7 +461,7 @@
           <a:p>
             <a:fld id="{1B6CB649-B23B-4A05-B2FC-2C0823D80EF2}" type="datetimeFigureOut">
               <a:rPr lang="en-US" smtClean="0"/>
-              <a:t>9/8/2018</a:t>
+              <a:t>9/9/2018</a:t>
             </a:fld>
             <a:endParaRPr lang="en-US"/>
           </a:p>
@@ -664,7 +669,7 @@
           <a:p>
             <a:fld id="{1B6CB649-B23B-4A05-B2FC-2C0823D80EF2}" type="datetimeFigureOut">
               <a:rPr lang="en-US" smtClean="0"/>
-              <a:t>9/8/2018</a:t>
+              <a:t>9/9/2018</a:t>
             </a:fld>
             <a:endParaRPr lang="en-US"/>
           </a:p>
@@ -862,7 +867,7 @@
           <a:p>
             <a:fld id="{1B6CB649-B23B-4A05-B2FC-2C0823D80EF2}" type="datetimeFigureOut">
               <a:rPr lang="en-US" smtClean="0"/>
-              <a:t>9/8/2018</a:t>
+              <a:t>9/9/2018</a:t>
             </a:fld>
             <a:endParaRPr lang="en-US"/>
           </a:p>
@@ -1137,7 +1142,7 @@
           <a:p>
             <a:fld id="{1B6CB649-B23B-4A05-B2FC-2C0823D80EF2}" type="datetimeFigureOut">
               <a:rPr lang="en-US" smtClean="0"/>
-              <a:t>9/8/2018</a:t>
+              <a:t>9/9/2018</a:t>
             </a:fld>
             <a:endParaRPr lang="en-US"/>
           </a:p>
@@ -1402,7 +1407,7 @@
           <a:p>
             <a:fld id="{1B6CB649-B23B-4A05-B2FC-2C0823D80EF2}" type="datetimeFigureOut">
               <a:rPr lang="en-US" smtClean="0"/>
-              <a:t>9/8/2018</a:t>
+              <a:t>9/9/2018</a:t>
             </a:fld>
             <a:endParaRPr lang="en-US"/>
           </a:p>
@@ -1814,7 +1819,7 @@
           <a:p>
             <a:fld id="{1B6CB649-B23B-4A05-B2FC-2C0823D80EF2}" type="datetimeFigureOut">
               <a:rPr lang="en-US" smtClean="0"/>
-              <a:t>9/8/2018</a:t>
+              <a:t>9/9/2018</a:t>
             </a:fld>
             <a:endParaRPr lang="en-US"/>
           </a:p>
@@ -1955,7 +1960,7 @@
           <a:p>
             <a:fld id="{1B6CB649-B23B-4A05-B2FC-2C0823D80EF2}" type="datetimeFigureOut">
               <a:rPr lang="en-US" smtClean="0"/>
-              <a:t>9/8/2018</a:t>
+              <a:t>9/9/2018</a:t>
             </a:fld>
             <a:endParaRPr lang="en-US"/>
           </a:p>
@@ -2068,7 +2073,7 @@
           <a:p>
             <a:fld id="{1B6CB649-B23B-4A05-B2FC-2C0823D80EF2}" type="datetimeFigureOut">
               <a:rPr lang="en-US" smtClean="0"/>
-              <a:t>9/8/2018</a:t>
+              <a:t>9/9/2018</a:t>
             </a:fld>
             <a:endParaRPr lang="en-US"/>
           </a:p>
@@ -2379,7 +2384,7 @@
           <a:p>
             <a:fld id="{1B6CB649-B23B-4A05-B2FC-2C0823D80EF2}" type="datetimeFigureOut">
               <a:rPr lang="en-US" smtClean="0"/>
-              <a:t>9/8/2018</a:t>
+              <a:t>9/9/2018</a:t>
             </a:fld>
             <a:endParaRPr lang="en-US"/>
           </a:p>
@@ -2667,7 +2672,7 @@
           <a:p>
             <a:fld id="{1B6CB649-B23B-4A05-B2FC-2C0823D80EF2}" type="datetimeFigureOut">
               <a:rPr lang="en-US" smtClean="0"/>
-              <a:t>9/8/2018</a:t>
+              <a:t>9/9/2018</a:t>
             </a:fld>
             <a:endParaRPr lang="en-US"/>
           </a:p>
@@ -2908,7 +2913,7 @@
           <a:p>
             <a:fld id="{1B6CB649-B23B-4A05-B2FC-2C0823D80EF2}" type="datetimeFigureOut">
               <a:rPr lang="en-US" smtClean="0"/>
-              <a:t>9/8/2018</a:t>
+              <a:t>9/9/2018</a:t>
             </a:fld>
             <a:endParaRPr lang="en-US"/>
           </a:p>
@@ -3688,16 +3693,6 @@
               <a:buNone/>
             </a:pPr>
             <a:r>
-              <a:rPr lang="en-US" sz="4100" b="1" dirty="0" err="1">
-                <a:solidFill>
-                  <a:srgbClr val="69626D"/>
-                </a:solidFill>
-                <a:latin typeface="Roboto" pitchFamily="2" charset="0"/>
-                <a:ea typeface="Roboto" pitchFamily="2" charset="0"/>
-              </a:rPr>
-              <a:t>Steeve</a:t>
-            </a:r>
-            <a:r>
               <a:rPr lang="en-US" sz="4100" b="1" dirty="0">
                 <a:solidFill>
                   <a:srgbClr val="69626D"/>
@@ -3705,7 +3700,7 @@
                 <a:latin typeface="Roboto" pitchFamily="2" charset="0"/>
                 <a:ea typeface="Roboto" pitchFamily="2" charset="0"/>
               </a:rPr>
-              <a:t> Joseph</a:t>
+              <a:t>Steeve Joseph</a:t>
             </a:r>
           </a:p>
           <a:p>
@@ -3737,16 +3732,6 @@
               <a:buNone/>
             </a:pPr>
             <a:r>
-              <a:rPr lang="en-US" sz="4100" b="1" dirty="0" err="1">
-                <a:solidFill>
-                  <a:srgbClr val="69626D"/>
-                </a:solidFill>
-                <a:latin typeface="Roboto" pitchFamily="2" charset="0"/>
-                <a:ea typeface="Roboto" pitchFamily="2" charset="0"/>
-              </a:rPr>
-              <a:t>Affner</a:t>
-            </a:r>
-            <a:r>
               <a:rPr lang="en-US" sz="4100" b="1" dirty="0">
                 <a:solidFill>
                   <a:srgbClr val="69626D"/>
@@ -3754,7 +3739,7 @@
                 <a:latin typeface="Roboto" pitchFamily="2" charset="0"/>
                 <a:ea typeface="Roboto" pitchFamily="2" charset="0"/>
               </a:rPr>
-              <a:t> Lefevre</a:t>
+              <a:t>Affner Lefevre</a:t>
             </a:r>
           </a:p>
           <a:p>
@@ -3883,25 +3868,8 @@
                 <a:latin typeface="Roboto" pitchFamily="2" charset="0"/>
                 <a:ea typeface="Roboto" pitchFamily="2" charset="0"/>
               </a:rPr>
-              <a:t>Brian </a:t>
-            </a:r>
-            <a:r>
-              <a:rPr lang="en-US" sz="4100" b="1" dirty="0" err="1">
-                <a:solidFill>
-                  <a:srgbClr val="69626D"/>
-                </a:solidFill>
-                <a:latin typeface="Roboto" pitchFamily="2" charset="0"/>
-                <a:ea typeface="Roboto" pitchFamily="2" charset="0"/>
-              </a:rPr>
-              <a:t>Wittel</a:t>
-            </a:r>
-            <a:endParaRPr lang="en-US" sz="4100" b="1" dirty="0">
-              <a:solidFill>
-                <a:srgbClr val="69626D"/>
-              </a:solidFill>
-              <a:latin typeface="Roboto" pitchFamily="2" charset="0"/>
-              <a:ea typeface="Roboto" pitchFamily="2" charset="0"/>
-            </a:endParaRPr>
+              <a:t>Brian Wittel</a:t>
+            </a:r>
           </a:p>
           <a:p>
             <a:pPr marL="0" indent="0">
@@ -4188,34 +4156,41 @@
           </a:p>
         </p:txBody>
       </p:sp>
-      <p:sp>
-        <p:nvSpPr>
-          <p:cNvPr id="3" name="Content Placeholder 2">
-            <a:extLst>
-              <a:ext uri="{FF2B5EF4-FFF2-40B4-BE49-F238E27FC236}">
-                <a16:creationId xmlns:a16="http://schemas.microsoft.com/office/drawing/2014/main" id="{7AF08133-8C63-4A33-BD22-9E6C47E755E8}"/>
-              </a:ext>
-            </a:extLst>
-          </p:cNvPr>
-          <p:cNvSpPr>
-            <a:spLocks noGrp="1"/>
-          </p:cNvSpPr>
+      <p:pic>
+        <p:nvPicPr>
+          <p:cNvPr id="13" name="Content Placeholder 12">
+            <a:extLst>
+              <a:ext uri="{FF2B5EF4-FFF2-40B4-BE49-F238E27FC236}">
+                <a16:creationId xmlns:a16="http://schemas.microsoft.com/office/drawing/2014/main" id="{A7824C2C-2D98-4D50-888B-A6002AA29C20}"/>
+              </a:ext>
+            </a:extLst>
+          </p:cNvPr>
+          <p:cNvPicPr>
+            <a:picLocks noGrp="1" noChangeAspect="1"/>
+          </p:cNvPicPr>
           <p:nvPr>
             <p:ph idx="1"/>
           </p:nvPr>
-        </p:nvSpPr>
-        <p:spPr/>
-        <p:txBody>
-          <a:bodyPr/>
-          <a:lstStyle/>
-          <a:p>
-            <a:pPr marL="0" indent="0">
-              <a:buNone/>
-            </a:pPr>
-            <a:endParaRPr lang="en-US" dirty="0"/>
-          </a:p>
-        </p:txBody>
-      </p:sp>
+        </p:nvPicPr>
+        <p:blipFill>
+          <a:blip r:embed="rId2">
+            <a:extLst>
+              <a:ext uri="{28A0092B-C50C-407E-A947-70E740481C1C}">
+                <a14:useLocalDpi xmlns:a14="http://schemas.microsoft.com/office/drawing/2010/main" val="0"/>
+              </a:ext>
+            </a:extLst>
+          </a:blip>
+          <a:stretch>
+            <a:fillRect/>
+          </a:stretch>
+        </p:blipFill>
+        <p:spPr>
+          <a:xfrm>
+            <a:off x="2018710" y="1629728"/>
+            <a:ext cx="5258979" cy="4351338"/>
+          </a:xfrm>
+        </p:spPr>
+      </p:pic>
     </p:spTree>
     <p:extLst>
       <p:ext uri="{BB962C8B-B14F-4D97-AF65-F5344CB8AC3E}">

</xml_diff>

<commit_message>
the really real powerpoint 2.0
Spiced things up a bit...I really don't know how to make the second slide look nice though lol
</commit_message>
<xml_diff>
--- a/ContactManager.pptx
+++ b/ContactManager.pptx
@@ -9,7 +9,7 @@
     <p:sldId id="257" r:id="rId3"/>
     <p:sldId id="264" r:id="rId4"/>
     <p:sldId id="261" r:id="rId5"/>
-    <p:sldId id="263" r:id="rId6"/>
+    <p:sldId id="265" r:id="rId6"/>
   </p:sldIdLst>
   <p:sldSz cx="12192000" cy="6858000"/>
   <p:notesSz cx="6858000" cy="9144000"/>
@@ -263,7 +263,7 @@
           <a:p>
             <a:fld id="{1B6CB649-B23B-4A05-B2FC-2C0823D80EF2}" type="datetimeFigureOut">
               <a:rPr lang="en-US" smtClean="0"/>
-              <a:t>9/9/2018</a:t>
+              <a:t>9/10/2018</a:t>
             </a:fld>
             <a:endParaRPr lang="en-US"/>
           </a:p>
@@ -461,7 +461,7 @@
           <a:p>
             <a:fld id="{1B6CB649-B23B-4A05-B2FC-2C0823D80EF2}" type="datetimeFigureOut">
               <a:rPr lang="en-US" smtClean="0"/>
-              <a:t>9/9/2018</a:t>
+              <a:t>9/10/2018</a:t>
             </a:fld>
             <a:endParaRPr lang="en-US"/>
           </a:p>
@@ -669,7 +669,7 @@
           <a:p>
             <a:fld id="{1B6CB649-B23B-4A05-B2FC-2C0823D80EF2}" type="datetimeFigureOut">
               <a:rPr lang="en-US" smtClean="0"/>
-              <a:t>9/9/2018</a:t>
+              <a:t>9/10/2018</a:t>
             </a:fld>
             <a:endParaRPr lang="en-US"/>
           </a:p>
@@ -867,7 +867,7 @@
           <a:p>
             <a:fld id="{1B6CB649-B23B-4A05-B2FC-2C0823D80EF2}" type="datetimeFigureOut">
               <a:rPr lang="en-US" smtClean="0"/>
-              <a:t>9/9/2018</a:t>
+              <a:t>9/10/2018</a:t>
             </a:fld>
             <a:endParaRPr lang="en-US"/>
           </a:p>
@@ -1142,7 +1142,7 @@
           <a:p>
             <a:fld id="{1B6CB649-B23B-4A05-B2FC-2C0823D80EF2}" type="datetimeFigureOut">
               <a:rPr lang="en-US" smtClean="0"/>
-              <a:t>9/9/2018</a:t>
+              <a:t>9/10/2018</a:t>
             </a:fld>
             <a:endParaRPr lang="en-US"/>
           </a:p>
@@ -1407,7 +1407,7 @@
           <a:p>
             <a:fld id="{1B6CB649-B23B-4A05-B2FC-2C0823D80EF2}" type="datetimeFigureOut">
               <a:rPr lang="en-US" smtClean="0"/>
-              <a:t>9/9/2018</a:t>
+              <a:t>9/10/2018</a:t>
             </a:fld>
             <a:endParaRPr lang="en-US"/>
           </a:p>
@@ -1819,7 +1819,7 @@
           <a:p>
             <a:fld id="{1B6CB649-B23B-4A05-B2FC-2C0823D80EF2}" type="datetimeFigureOut">
               <a:rPr lang="en-US" smtClean="0"/>
-              <a:t>9/9/2018</a:t>
+              <a:t>9/10/2018</a:t>
             </a:fld>
             <a:endParaRPr lang="en-US"/>
           </a:p>
@@ -1960,7 +1960,7 @@
           <a:p>
             <a:fld id="{1B6CB649-B23B-4A05-B2FC-2C0823D80EF2}" type="datetimeFigureOut">
               <a:rPr lang="en-US" smtClean="0"/>
-              <a:t>9/9/2018</a:t>
+              <a:t>9/10/2018</a:t>
             </a:fld>
             <a:endParaRPr lang="en-US"/>
           </a:p>
@@ -2073,7 +2073,7 @@
           <a:p>
             <a:fld id="{1B6CB649-B23B-4A05-B2FC-2C0823D80EF2}" type="datetimeFigureOut">
               <a:rPr lang="en-US" smtClean="0"/>
-              <a:t>9/9/2018</a:t>
+              <a:t>9/10/2018</a:t>
             </a:fld>
             <a:endParaRPr lang="en-US"/>
           </a:p>
@@ -2384,7 +2384,7 @@
           <a:p>
             <a:fld id="{1B6CB649-B23B-4A05-B2FC-2C0823D80EF2}" type="datetimeFigureOut">
               <a:rPr lang="en-US" smtClean="0"/>
-              <a:t>9/9/2018</a:t>
+              <a:t>9/10/2018</a:t>
             </a:fld>
             <a:endParaRPr lang="en-US"/>
           </a:p>
@@ -2672,7 +2672,7 @@
           <a:p>
             <a:fld id="{1B6CB649-B23B-4A05-B2FC-2C0823D80EF2}" type="datetimeFigureOut">
               <a:rPr lang="en-US" smtClean="0"/>
-              <a:t>9/9/2018</a:t>
+              <a:t>9/10/2018</a:t>
             </a:fld>
             <a:endParaRPr lang="en-US"/>
           </a:p>
@@ -2913,7 +2913,7 @@
           <a:p>
             <a:fld id="{1B6CB649-B23B-4A05-B2FC-2C0823D80EF2}" type="datetimeFigureOut">
               <a:rPr lang="en-US" smtClean="0"/>
-              <a:t>9/9/2018</a:t>
+              <a:t>9/10/2018</a:t>
             </a:fld>
             <a:endParaRPr lang="en-US"/>
           </a:p>
@@ -3499,27 +3499,15 @@
         </p:nvSpPr>
         <p:spPr>
           <a:xfrm>
-            <a:off x="838200" y="2077403"/>
-            <a:ext cx="10515600" cy="4415472"/>
+            <a:off x="838200" y="2366127"/>
+            <a:ext cx="10515600" cy="4242062"/>
           </a:xfrm>
         </p:spPr>
         <p:txBody>
           <a:bodyPr numCol="3">
-            <a:normAutofit fontScale="70000" lnSpcReduction="20000"/>
+            <a:normAutofit fontScale="77500" lnSpcReduction="20000"/>
           </a:bodyPr>
           <a:lstStyle/>
-          <a:p>
-            <a:pPr marL="0" indent="0">
-              <a:buNone/>
-            </a:pPr>
-            <a:endParaRPr lang="en-US" b="1" dirty="0">
-              <a:solidFill>
-                <a:srgbClr val="78717D"/>
-              </a:solidFill>
-              <a:latin typeface="Roboto" pitchFamily="2" charset="0"/>
-              <a:ea typeface="Roboto" pitchFamily="2" charset="0"/>
-            </a:endParaRPr>
-          </a:p>
           <a:p>
             <a:pPr marL="0" indent="0" algn="ctr">
               <a:buNone/>
@@ -3641,18 +3629,6 @@
             <a:pPr marL="0" indent="0" algn="ctr">
               <a:buNone/>
             </a:pPr>
-            <a:endParaRPr lang="en-US" sz="4100" b="1" dirty="0">
-              <a:solidFill>
-                <a:srgbClr val="69626D"/>
-              </a:solidFill>
-              <a:latin typeface="Roboto" pitchFamily="2" charset="0"/>
-              <a:ea typeface="Roboto" pitchFamily="2" charset="0"/>
-            </a:endParaRPr>
-          </a:p>
-          <a:p>
-            <a:pPr marL="0" indent="0" algn="ctr">
-              <a:buNone/>
-            </a:pPr>
             <a:r>
               <a:rPr lang="en-US" sz="4100" b="1" dirty="0">
                 <a:solidFill>
@@ -3770,18 +3746,6 @@
             <a:pPr marL="0" indent="0" algn="ctr">
               <a:buNone/>
             </a:pPr>
-            <a:endParaRPr lang="en-US" sz="4100" b="1" dirty="0">
-              <a:solidFill>
-                <a:srgbClr val="69626D"/>
-              </a:solidFill>
-              <a:latin typeface="Roboto" pitchFamily="2" charset="0"/>
-              <a:ea typeface="Roboto" pitchFamily="2" charset="0"/>
-            </a:endParaRPr>
-          </a:p>
-          <a:p>
-            <a:pPr marL="0" indent="0" algn="ctr">
-              <a:buNone/>
-            </a:pPr>
             <a:r>
               <a:rPr lang="en-US" sz="4100" b="1" dirty="0">
                 <a:solidFill>
@@ -3882,6 +3846,51 @@
               <a:buNone/>
             </a:pPr>
             <a:endParaRPr lang="en-US" dirty="0"/>
+          </a:p>
+        </p:txBody>
+      </p:sp>
+      <p:sp>
+        <p:nvSpPr>
+          <p:cNvPr id="4" name="AutoShape 2" descr="Image result for universe 7 transparent">
+            <a:extLst>
+              <a:ext uri="{FF2B5EF4-FFF2-40B4-BE49-F238E27FC236}">
+                <a16:creationId xmlns:a16="http://schemas.microsoft.com/office/drawing/2014/main" id="{2E1D7671-06A2-4D8D-B201-7F8BF252C8F4}"/>
+              </a:ext>
+            </a:extLst>
+          </p:cNvPr>
+          <p:cNvSpPr>
+            <a:spLocks noChangeAspect="1" noChangeArrowheads="1"/>
+          </p:cNvSpPr>
+          <p:nvPr/>
+        </p:nvSpPr>
+        <p:spPr bwMode="auto">
+          <a:xfrm>
+            <a:off x="5943600" y="3276600"/>
+            <a:ext cx="304800" cy="304800"/>
+          </a:xfrm>
+          <a:prstGeom prst="rect">
+            <a:avLst/>
+          </a:prstGeom>
+          <a:noFill/>
+          <a:extLst>
+            <a:ext uri="{909E8E84-426E-40DD-AFC4-6F175D3DCCD1}">
+              <a14:hiddenFill xmlns:a14="http://schemas.microsoft.com/office/drawing/2010/main">
+                <a:solidFill>
+                  <a:srgbClr val="FFFFFF"/>
+                </a:solidFill>
+              </a14:hiddenFill>
+            </a:ext>
+          </a:extLst>
+        </p:spPr>
+        <p:txBody>
+          <a:bodyPr vert="horz" wrap="square" lIns="91440" tIns="45720" rIns="91440" bIns="45720" numCol="1" anchor="t" anchorCtr="0" compatLnSpc="1">
+            <a:prstTxWarp prst="textNoShape">
+              <a:avLst/>
+            </a:prstTxWarp>
+          </a:bodyPr>
+          <a:lstStyle/>
+          <a:p>
+            <a:endParaRPr lang="en-US"/>
           </a:p>
         </p:txBody>
       </p:sp>
@@ -3904,7 +3913,7 @@
     <p:bg>
       <p:bgPr>
         <a:solidFill>
-          <a:srgbClr val="555B6E"/>
+          <a:schemeClr val="bg1"/>
         </a:solidFill>
         <a:effectLst/>
       </p:bgPr>
@@ -3939,13 +3948,18 @@
             <p:ph type="title"/>
           </p:nvPr>
         </p:nvSpPr>
-        <p:spPr/>
-        <p:txBody>
-          <a:bodyPr/>
-          <a:lstStyle/>
-          <a:p>
-            <a:r>
-              <a:rPr lang="en-US" b="1" dirty="0">
+        <p:spPr>
+          <a:xfrm>
+            <a:off x="838200" y="277351"/>
+            <a:ext cx="10515600" cy="1325563"/>
+          </a:xfrm>
+        </p:spPr>
+        <p:txBody>
+          <a:bodyPr/>
+          <a:lstStyle/>
+          <a:p>
+            <a:r>
+              <a:rPr lang="en-US" b="1">
                 <a:solidFill>
                   <a:schemeClr val="bg1"/>
                 </a:solidFill>
@@ -3961,28 +3975,283 @@
           </a:p>
         </p:txBody>
       </p:sp>
-      <p:sp>
-        <p:nvSpPr>
-          <p:cNvPr id="3" name="Content Placeholder 2">
-            <a:extLst>
-              <a:ext uri="{FF2B5EF4-FFF2-40B4-BE49-F238E27FC236}">
-                <a16:creationId xmlns:a16="http://schemas.microsoft.com/office/drawing/2014/main" id="{900C3481-B50A-4157-86DA-8359ECE9715F}"/>
-              </a:ext>
-            </a:extLst>
-          </p:cNvPr>
-          <p:cNvSpPr>
-            <a:spLocks noGrp="1"/>
-          </p:cNvSpPr>
+      <p:pic>
+        <p:nvPicPr>
+          <p:cNvPr id="7" name="Content Placeholder 6">
+            <a:extLst>
+              <a:ext uri="{FF2B5EF4-FFF2-40B4-BE49-F238E27FC236}">
+                <a16:creationId xmlns:a16="http://schemas.microsoft.com/office/drawing/2014/main" id="{16FAF8CB-ADA2-4160-98BB-F8E22C0DFDC7}"/>
+              </a:ext>
+            </a:extLst>
+          </p:cNvPr>
+          <p:cNvPicPr>
+            <a:picLocks noGrp="1" noChangeAspect="1"/>
+          </p:cNvPicPr>
           <p:nvPr>
             <p:ph idx="1"/>
           </p:nvPr>
-        </p:nvSpPr>
-        <p:spPr/>
-        <p:txBody>
-          <a:bodyPr/>
-          <a:lstStyle/>
+        </p:nvPicPr>
+        <p:blipFill>
+          <a:blip r:embed="rId2"/>
+          <a:stretch>
+            <a:fillRect/>
+          </a:stretch>
+        </p:blipFill>
+        <p:spPr>
+          <a:xfrm>
+            <a:off x="463614" y="3083280"/>
+            <a:ext cx="5075077" cy="2349761"/>
+          </a:xfrm>
+          <a:prstGeom prst="rect">
+            <a:avLst/>
+          </a:prstGeom>
+        </p:spPr>
+      </p:pic>
+      <p:sp>
+        <p:nvSpPr>
+          <p:cNvPr id="9" name="Rectangle 8">
+            <a:extLst>
+              <a:ext uri="{FF2B5EF4-FFF2-40B4-BE49-F238E27FC236}">
+                <a16:creationId xmlns:a16="http://schemas.microsoft.com/office/drawing/2014/main" id="{1072C5D9-EF33-43A0-AD07-537A6EB31424}"/>
+              </a:ext>
+            </a:extLst>
+          </p:cNvPr>
+          <p:cNvSpPr/>
+          <p:nvPr/>
+        </p:nvSpPr>
+        <p:spPr>
+          <a:xfrm>
+            <a:off x="-16599" y="495365"/>
+            <a:ext cx="12208599" cy="1325563"/>
+          </a:xfrm>
+          <a:prstGeom prst="rect">
+            <a:avLst/>
+          </a:prstGeom>
+          <a:solidFill>
+            <a:srgbClr val="555B6E"/>
+          </a:solidFill>
+          <a:ln>
+            <a:noFill/>
+          </a:ln>
+        </p:spPr>
+        <p:style>
+          <a:lnRef idx="2">
+            <a:schemeClr val="accent1">
+              <a:shade val="50000"/>
+            </a:schemeClr>
+          </a:lnRef>
+          <a:fillRef idx="1">
+            <a:schemeClr val="accent1"/>
+          </a:fillRef>
+          <a:effectRef idx="0">
+            <a:schemeClr val="accent1"/>
+          </a:effectRef>
+          <a:fontRef idx="minor">
+            <a:schemeClr val="lt1"/>
+          </a:fontRef>
+        </p:style>
+        <p:txBody>
+          <a:bodyPr rtlCol="0" anchor="ctr"/>
+          <a:lstStyle/>
+          <a:p>
+            <a:pPr algn="ctr"/>
+            <a:endParaRPr lang="en-US"/>
+          </a:p>
+        </p:txBody>
+      </p:sp>
+      <p:sp>
+        <p:nvSpPr>
+          <p:cNvPr id="10" name="TextBox 9">
+            <a:extLst>
+              <a:ext uri="{FF2B5EF4-FFF2-40B4-BE49-F238E27FC236}">
+                <a16:creationId xmlns:a16="http://schemas.microsoft.com/office/drawing/2014/main" id="{885C5424-321F-4858-8015-253B4EC0CCAA}"/>
+              </a:ext>
+            </a:extLst>
+          </p:cNvPr>
+          <p:cNvSpPr txBox="1"/>
+          <p:nvPr/>
+        </p:nvSpPr>
+        <p:spPr>
+          <a:xfrm>
+            <a:off x="3230542" y="774488"/>
+            <a:ext cx="5391239" cy="1046440"/>
+          </a:xfrm>
+          <a:prstGeom prst="rect">
+            <a:avLst/>
+          </a:prstGeom>
+          <a:noFill/>
+        </p:spPr>
+        <p:txBody>
+          <a:bodyPr wrap="square" rtlCol="0">
+            <a:spAutoFit/>
+          </a:bodyPr>
+          <a:lstStyle/>
+          <a:p>
+            <a:r>
+              <a:rPr lang="en-US" sz="4400" b="1" dirty="0">
+                <a:solidFill>
+                  <a:schemeClr val="bg1"/>
+                </a:solidFill>
+                <a:latin typeface="Roboto" pitchFamily="2" charset="0"/>
+                <a:ea typeface="Roboto" pitchFamily="2" charset="0"/>
+              </a:rPr>
+              <a:t>Development Tools</a:t>
+            </a:r>
+            <a:endParaRPr lang="en-US" b="1" dirty="0"/>
+          </a:p>
           <a:p>
             <a:endParaRPr lang="en-US" dirty="0"/>
+          </a:p>
+        </p:txBody>
+      </p:sp>
+      <p:pic>
+        <p:nvPicPr>
+          <p:cNvPr id="1028" name="Picture 4" descr="Image result for vuejs">
+            <a:extLst>
+              <a:ext uri="{FF2B5EF4-FFF2-40B4-BE49-F238E27FC236}">
+                <a16:creationId xmlns:a16="http://schemas.microsoft.com/office/drawing/2014/main" id="{BB0EFC4D-0BB7-4B3F-9856-BF883D32E8D8}"/>
+              </a:ext>
+            </a:extLst>
+          </p:cNvPr>
+          <p:cNvPicPr>
+            <a:picLocks noChangeAspect="1" noChangeArrowheads="1"/>
+          </p:cNvPicPr>
+          <p:nvPr/>
+        </p:nvPicPr>
+        <p:blipFill>
+          <a:blip r:embed="rId3">
+            <a:extLst>
+              <a:ext uri="{28A0092B-C50C-407E-A947-70E740481C1C}">
+                <a14:useLocalDpi xmlns:a14="http://schemas.microsoft.com/office/drawing/2010/main" val="0"/>
+              </a:ext>
+            </a:extLst>
+          </a:blip>
+          <a:srcRect/>
+          <a:stretch>
+            <a:fillRect/>
+          </a:stretch>
+        </p:blipFill>
+        <p:spPr bwMode="auto">
+          <a:xfrm>
+            <a:off x="6918857" y="3137876"/>
+            <a:ext cx="4434943" cy="2240570"/>
+          </a:xfrm>
+          <a:prstGeom prst="rect">
+            <a:avLst/>
+          </a:prstGeom>
+          <a:noFill/>
+          <a:extLst>
+            <a:ext uri="{909E8E84-426E-40DD-AFC4-6F175D3DCCD1}">
+              <a14:hiddenFill xmlns:a14="http://schemas.microsoft.com/office/drawing/2010/main">
+                <a:solidFill>
+                  <a:srgbClr val="FFFFFF"/>
+                </a:solidFill>
+              </a14:hiddenFill>
+            </a:ext>
+          </a:extLst>
+        </p:spPr>
+      </p:pic>
+      <p:sp>
+        <p:nvSpPr>
+          <p:cNvPr id="11" name="Rectangle 10">
+            <a:extLst>
+              <a:ext uri="{FF2B5EF4-FFF2-40B4-BE49-F238E27FC236}">
+                <a16:creationId xmlns:a16="http://schemas.microsoft.com/office/drawing/2014/main" id="{3B3B32A5-62EB-472C-BD1C-43616BC2EE43}"/>
+              </a:ext>
+            </a:extLst>
+          </p:cNvPr>
+          <p:cNvSpPr/>
+          <p:nvPr/>
+        </p:nvSpPr>
+        <p:spPr>
+          <a:xfrm>
+            <a:off x="5907308" y="2539568"/>
+            <a:ext cx="45719" cy="3440199"/>
+          </a:xfrm>
+          <a:prstGeom prst="rect">
+            <a:avLst/>
+          </a:prstGeom>
+          <a:solidFill>
+            <a:srgbClr val="555B6E"/>
+          </a:solidFill>
+          <a:ln>
+            <a:noFill/>
+          </a:ln>
+        </p:spPr>
+        <p:style>
+          <a:lnRef idx="2">
+            <a:schemeClr val="accent1">
+              <a:shade val="50000"/>
+            </a:schemeClr>
+          </a:lnRef>
+          <a:fillRef idx="1">
+            <a:schemeClr val="accent1"/>
+          </a:fillRef>
+          <a:effectRef idx="0">
+            <a:schemeClr val="accent1"/>
+          </a:effectRef>
+          <a:fontRef idx="minor">
+            <a:schemeClr val="lt1"/>
+          </a:fontRef>
+        </p:style>
+        <p:txBody>
+          <a:bodyPr rtlCol="0" anchor="ctr"/>
+          <a:lstStyle/>
+          <a:p>
+            <a:pPr algn="ctr"/>
+            <a:endParaRPr lang="en-US"/>
+          </a:p>
+        </p:txBody>
+      </p:sp>
+      <p:sp>
+        <p:nvSpPr>
+          <p:cNvPr id="20" name="Rectangle 19">
+            <a:extLst>
+              <a:ext uri="{FF2B5EF4-FFF2-40B4-BE49-F238E27FC236}">
+                <a16:creationId xmlns:a16="http://schemas.microsoft.com/office/drawing/2014/main" id="{7117089C-7020-448C-BF61-C8B5D5A5437F}"/>
+              </a:ext>
+            </a:extLst>
+          </p:cNvPr>
+          <p:cNvSpPr/>
+          <p:nvPr/>
+        </p:nvSpPr>
+        <p:spPr>
+          <a:xfrm>
+            <a:off x="5983507" y="2539567"/>
+            <a:ext cx="45719" cy="3440199"/>
+          </a:xfrm>
+          <a:prstGeom prst="rect">
+            <a:avLst/>
+          </a:prstGeom>
+          <a:solidFill>
+            <a:srgbClr val="555B6E"/>
+          </a:solidFill>
+          <a:ln>
+            <a:noFill/>
+          </a:ln>
+        </p:spPr>
+        <p:style>
+          <a:lnRef idx="2">
+            <a:schemeClr val="accent1">
+              <a:shade val="50000"/>
+            </a:schemeClr>
+          </a:lnRef>
+          <a:fillRef idx="1">
+            <a:schemeClr val="accent1"/>
+          </a:fillRef>
+          <a:effectRef idx="0">
+            <a:schemeClr val="accent1"/>
+          </a:effectRef>
+          <a:fontRef idx="minor">
+            <a:schemeClr val="lt1"/>
+          </a:fontRef>
+        </p:style>
+        <p:txBody>
+          <a:bodyPr rtlCol="0" anchor="ctr"/>
+          <a:lstStyle/>
+          <a:p>
+            <a:pPr algn="ctr"/>
+            <a:endParaRPr lang="en-US"/>
           </a:p>
         </p:txBody>
       </p:sp>
@@ -4040,47 +4309,67 @@
             <p:ph type="title"/>
           </p:nvPr>
         </p:nvSpPr>
-        <p:spPr/>
-        <p:txBody>
-          <a:bodyPr/>
-          <a:lstStyle/>
-          <a:p>
-            <a:r>
-              <a:rPr lang="en-US" b="1" dirty="0">
+        <p:spPr>
+          <a:xfrm>
+            <a:off x="414779" y="94268"/>
+            <a:ext cx="2963162" cy="3148553"/>
+          </a:xfrm>
+          <a:noFill/>
+          <a:ln>
+            <a:noFill/>
+          </a:ln>
+        </p:spPr>
+        <p:txBody>
+          <a:bodyPr>
+            <a:normAutofit/>
+          </a:bodyPr>
+          <a:lstStyle/>
+          <a:p>
+            <a:r>
+              <a:rPr lang="en-US" sz="6600" b="1" dirty="0">
                 <a:solidFill>
                   <a:srgbClr val="696D7D"/>
                 </a:solidFill>
               </a:rPr>
-              <a:t>Anything that we feel is important</a:t>
-            </a:r>
-          </a:p>
-        </p:txBody>
-      </p:sp>
-      <p:sp>
-        <p:nvSpPr>
-          <p:cNvPr id="3" name="Content Placeholder 2">
-            <a:extLst>
-              <a:ext uri="{FF2B5EF4-FFF2-40B4-BE49-F238E27FC236}">
-                <a16:creationId xmlns:a16="http://schemas.microsoft.com/office/drawing/2014/main" id="{030A935D-BE8F-4046-BD1F-539C1702ABED}"/>
-              </a:ext>
-            </a:extLst>
-          </p:cNvPr>
-          <p:cNvSpPr>
-            <a:spLocks noGrp="1"/>
-          </p:cNvSpPr>
+              <a:t>Use Case Diagram</a:t>
+            </a:r>
+          </a:p>
+        </p:txBody>
+      </p:sp>
+      <p:pic>
+        <p:nvPicPr>
+          <p:cNvPr id="5" name="Content Placeholder 12">
+            <a:extLst>
+              <a:ext uri="{FF2B5EF4-FFF2-40B4-BE49-F238E27FC236}">
+                <a16:creationId xmlns:a16="http://schemas.microsoft.com/office/drawing/2014/main" id="{31C1286E-7A49-44DA-A0F4-DAC0B2301DCF}"/>
+              </a:ext>
+            </a:extLst>
+          </p:cNvPr>
+          <p:cNvPicPr>
+            <a:picLocks noGrp="1" noChangeAspect="1"/>
+          </p:cNvPicPr>
           <p:nvPr>
             <p:ph idx="1"/>
           </p:nvPr>
-        </p:nvSpPr>
-        <p:spPr/>
-        <p:txBody>
-          <a:bodyPr/>
-          <a:lstStyle/>
-          <a:p>
-            <a:endParaRPr lang="en-US" dirty="0"/>
-          </a:p>
-        </p:txBody>
-      </p:sp>
+        </p:nvPicPr>
+        <p:blipFill rotWithShape="1">
+          <a:blip r:embed="rId2">
+            <a:extLst>
+              <a:ext uri="{28A0092B-C50C-407E-A947-70E740481C1C}">
+                <a14:useLocalDpi xmlns:a14="http://schemas.microsoft.com/office/drawing/2010/main" val="0"/>
+              </a:ext>
+            </a:extLst>
+          </a:blip>
+          <a:srcRect t="11021"/>
+          <a:stretch/>
+        </p:blipFill>
+        <p:spPr>
+          <a:xfrm>
+            <a:off x="4032119" y="1084082"/>
+            <a:ext cx="7270620" cy="5352814"/>
+          </a:xfrm>
+        </p:spPr>
+      </p:pic>
     </p:spTree>
     <p:extLst>
       <p:ext uri="{BB962C8B-B14F-4D97-AF65-F5344CB8AC3E}">
@@ -4100,7 +4389,7 @@
     <p:bg>
       <p:bgPr>
         <a:solidFill>
-          <a:srgbClr val="F9F8F8"/>
+          <a:srgbClr val="DEE5E5"/>
         </a:solidFill>
         <a:effectLst/>
       </p:bgPr>
@@ -4124,7 +4413,7 @@
           <p:cNvPr id="2" name="Title 1">
             <a:extLst>
               <a:ext uri="{FF2B5EF4-FFF2-40B4-BE49-F238E27FC236}">
-                <a16:creationId xmlns:a16="http://schemas.microsoft.com/office/drawing/2014/main" id="{F2E42311-D9E6-40F2-ADC3-5E08BF5F1480}"/>
+                <a16:creationId xmlns:a16="http://schemas.microsoft.com/office/drawing/2014/main" id="{BBF5EC6C-91B5-475D-8D66-227D0A38AC06}"/>
               </a:ext>
             </a:extLst>
           </p:cNvPr>
@@ -4137,31 +4426,37 @@
         </p:nvSpPr>
         <p:spPr>
           <a:xfrm>
-            <a:off x="685800" y="304165"/>
-            <a:ext cx="10515600" cy="1325563"/>
+            <a:off x="3214147" y="365125"/>
+            <a:ext cx="5763705" cy="1325563"/>
           </a:xfrm>
+          <a:solidFill>
+            <a:srgbClr val="DEE5E5"/>
+          </a:solidFill>
         </p:spPr>
         <p:txBody>
           <a:bodyPr/>
           <a:lstStyle/>
           <a:p>
+            <a:pPr algn="ctr"/>
             <a:r>
               <a:rPr lang="en-US" b="1" dirty="0">
                 <a:solidFill>
-                  <a:srgbClr val="BCC0C1"/>
+                  <a:srgbClr val="696D7D"/>
                 </a:solidFill>
+                <a:latin typeface="Roboto" pitchFamily="2" charset="0"/>
+                <a:ea typeface="Roboto" pitchFamily="2" charset="0"/>
               </a:rPr>
-              <a:t>UML or ERD Diagrams</a:t>
+              <a:t>ERD Diagram </a:t>
             </a:r>
           </a:p>
         </p:txBody>
       </p:sp>
       <p:pic>
         <p:nvPicPr>
-          <p:cNvPr id="13" name="Content Placeholder 12">
-            <a:extLst>
-              <a:ext uri="{FF2B5EF4-FFF2-40B4-BE49-F238E27FC236}">
-                <a16:creationId xmlns:a16="http://schemas.microsoft.com/office/drawing/2014/main" id="{A7824C2C-2D98-4D50-888B-A6002AA29C20}"/>
+          <p:cNvPr id="4" name="Content Placeholder 3">
+            <a:extLst>
+              <a:ext uri="{FF2B5EF4-FFF2-40B4-BE49-F238E27FC236}">
+                <a16:creationId xmlns:a16="http://schemas.microsoft.com/office/drawing/2014/main" id="{DC1D674F-C79A-4F65-A02C-EBFE1CD5CF2B}"/>
               </a:ext>
             </a:extLst>
           </p:cNvPr>
@@ -4173,28 +4468,25 @@
           </p:nvPr>
         </p:nvPicPr>
         <p:blipFill>
-          <a:blip r:embed="rId2">
-            <a:extLst>
-              <a:ext uri="{28A0092B-C50C-407E-A947-70E740481C1C}">
-                <a14:useLocalDpi xmlns:a14="http://schemas.microsoft.com/office/drawing/2010/main" val="0"/>
-              </a:ext>
-            </a:extLst>
-          </a:blip>
+          <a:blip r:embed="rId2"/>
           <a:stretch>
             <a:fillRect/>
           </a:stretch>
         </p:blipFill>
         <p:spPr>
           <a:xfrm>
-            <a:off x="2018710" y="1629728"/>
-            <a:ext cx="5258979" cy="4351338"/>
+            <a:off x="1463497" y="2163494"/>
+            <a:ext cx="8934268" cy="4329381"/>
           </a:xfrm>
+          <a:prstGeom prst="rect">
+            <a:avLst/>
+          </a:prstGeom>
         </p:spPr>
       </p:pic>
     </p:spTree>
     <p:extLst>
       <p:ext uri="{BB962C8B-B14F-4D97-AF65-F5344CB8AC3E}">
-        <p14:creationId xmlns:p14="http://schemas.microsoft.com/office/powerpoint/2010/main" val="3662910010"/>
+        <p14:creationId xmlns:p14="http://schemas.microsoft.com/office/powerpoint/2010/main" val="1905580947"/>
       </p:ext>
     </p:extLst>
   </p:cSld>

</xml_diff>